<commit_message>
delete a comment in the ppt file
</commit_message>
<xml_diff>
--- a/107_slides/第六週尋寶自走車.pptx
+++ b/107_slides/第六週尋寶自走車.pptx
@@ -162,31 +162,6 @@
 </p:cmAuthorLst>
 </file>
 
-<file path=ppt/comments/comment1.xml><?xml version="1.0" encoding="utf-8"?>
-<p:cmLst xmlns:a="http://schemas.openxmlformats.org/drawingml/2006/main" xmlns:r="http://schemas.openxmlformats.org/officeDocument/2006/relationships" xmlns:p="http://schemas.openxmlformats.org/presentationml/2006/main">
-  <p:cm authorId="1" dt="2019-01-11T22:54:07.527" idx="3">
-    <p:pos x="4376" y="3753"/>
-    <p:text>107-2學期，會加入輪子轉速感測器的部分嗎？</p:text>
-    <p:extLst mod="1">
-      <p:ext uri="{C676402C-5697-4E1C-873F-D02D1690AC5C}">
-        <p15:threadingInfo xmlns:p15="http://schemas.microsoft.com/office/powerpoint/2012/main" timeZoneBias="-480"/>
-      </p:ext>
-    </p:extLst>
-  </p:cm>
-  <p:cm authorId="2" dt="2019-01-15T05:04:06.287" idx="1">
-    <p:pos x="4376" y="3889"/>
-    <p:text>不會</p:text>
-    <p:extLst mod="1">
-      <p:ext uri="{C676402C-5697-4E1C-873F-D02D1690AC5C}">
-        <p15:threadingInfo xmlns:p15="http://schemas.microsoft.com/office/powerpoint/2012/main" timeZoneBias="-480">
-          <p15:parentCm authorId="1" idx="3"/>
-        </p15:threadingInfo>
-      </p:ext>
-    </p:extLst>
-  </p:cm>
-</p:cmLst>
-</file>
-
 <file path=ppt/notesMasters/notesMaster1.xml><?xml version="1.0" encoding="utf-8"?>
 <p:notesMaster xmlns:a="http://schemas.openxmlformats.org/drawingml/2006/main" xmlns:r="http://schemas.openxmlformats.org/officeDocument/2006/relationships" xmlns:p="http://schemas.openxmlformats.org/presentationml/2006/main">
   <p:cSld>
@@ -269,7 +244,7 @@
           <a:p>
             <a:fld id="{55034081-F1E0-4113-A6BC-1A1E1E009D56}" type="datetimeFigureOut">
               <a:rPr lang="zh-TW" altLang="en-US" smtClean="0"/>
-              <a:t>2019/1/17</a:t>
+              <a:t>2019/1/23</a:t>
             </a:fld>
             <a:endParaRPr lang="zh-TW" altLang="en-US"/>
           </a:p>
@@ -12482,8 +12457,8 @@
           </a:p>
         </p:txBody>
       </p:sp>
-      <mc:AlternateContent xmlns:mc="http://schemas.openxmlformats.org/markup-compatibility/2006">
-        <mc:Choice xmlns:a14="http://schemas.microsoft.com/office/drawing/2010/main" Requires="a14">
+      <mc:AlternateContent xmlns:mc="http://schemas.openxmlformats.org/markup-compatibility/2006" xmlns:a14="http://schemas.microsoft.com/office/drawing/2010/main">
+        <mc:Choice Requires="a14">
           <p:graphicFrame>
             <p:nvGraphicFramePr>
               <p:cNvPr id="5" name="內容版面配置區 4"/>
@@ -12501,7 +12476,7 @@
             </p:nvGraphicFramePr>
             <p:xfrm>
               <a:off x="741040" y="1986657"/>
-              <a:ext cx="11522719" cy="7213680"/>
+              <a:ext cx="11522719" cy="7457520"/>
             </p:xfrm>
             <a:graphic>
               <a:graphicData uri="http://schemas.openxmlformats.org/drawingml/2006/table">
@@ -12900,6 +12875,10 @@
                             <a:rPr lang="en-US" altLang="zh-TW" sz="1600" baseline="0" dirty="0"/>
                             <a:t>)</a:t>
                           </a:r>
+                          <a:r>
+                            <a:rPr lang="en-US" sz="1600" dirty="0"/>
+                            <a:t/>
+                          </a:r>
                           <a:br>
                             <a:rPr lang="en-US" sz="1600" dirty="0"/>
                           </a:br>
@@ -14420,7 +14399,7 @@
             </a:graphic>
           </p:graphicFrame>
         </mc:Choice>
-        <mc:Fallback>
+        <mc:Fallback xmlns="">
           <p:graphicFrame>
             <p:nvGraphicFramePr>
               <p:cNvPr id="5" name="內容版面配置區 4"/>

</xml_diff>

<commit_message>
Add an example about SFC (Sequential Function Chart) in W6 slide.
</commit_message>
<xml_diff>
--- a/107_slides/第六週尋寶自走車.pptx
+++ b/107_slides/第六週尋寶自走車.pptx
@@ -5,7 +5,7 @@
     <p:sldMasterId id="2147483672" r:id="rId1"/>
   </p:sldMasterIdLst>
   <p:notesMasterIdLst>
-    <p:notesMasterId r:id="rId31"/>
+    <p:notesMasterId r:id="rId32"/>
   </p:notesMasterIdLst>
   <p:sldIdLst>
     <p:sldId id="256" r:id="rId2"/>
@@ -30,13 +30,14 @@
     <p:sldId id="315" r:id="rId21"/>
     <p:sldId id="300" r:id="rId22"/>
     <p:sldId id="302" r:id="rId23"/>
-    <p:sldId id="303" r:id="rId24"/>
-    <p:sldId id="305" r:id="rId25"/>
-    <p:sldId id="307" r:id="rId26"/>
-    <p:sldId id="319" r:id="rId27"/>
-    <p:sldId id="309" r:id="rId28"/>
-    <p:sldId id="318" r:id="rId29"/>
-    <p:sldId id="299" r:id="rId30"/>
+    <p:sldId id="320" r:id="rId24"/>
+    <p:sldId id="303" r:id="rId25"/>
+    <p:sldId id="305" r:id="rId26"/>
+    <p:sldId id="307" r:id="rId27"/>
+    <p:sldId id="319" r:id="rId28"/>
+    <p:sldId id="309" r:id="rId29"/>
+    <p:sldId id="318" r:id="rId30"/>
+    <p:sldId id="299" r:id="rId31"/>
   </p:sldIdLst>
   <p:sldSz cx="13004800" cy="9753600"/>
   <p:notesSz cx="6858000" cy="9144000"/>
@@ -7529,6 +7530,232 @@
           <a:chExt cx="0" cy="0"/>
         </a:xfrm>
       </p:grpSpPr>
+      <p:pic>
+        <p:nvPicPr>
+          <p:cNvPr id="1026" name="Picture 2" descr="ãSequential function chartãçåçæå°çµæ"/>
+          <p:cNvPicPr>
+            <a:picLocks noGrp="1" noChangeAspect="1" noChangeArrowheads="1"/>
+          </p:cNvPicPr>
+          <p:nvPr>
+            <p:ph idx="1"/>
+          </p:nvPr>
+        </p:nvPicPr>
+        <p:blipFill rotWithShape="1">
+          <a:blip r:embed="rId2">
+            <a:extLst>
+              <a:ext uri="{28A0092B-C50C-407E-A947-70E740481C1C}">
+                <a14:useLocalDpi xmlns:a14="http://schemas.microsoft.com/office/drawing/2010/main" val="0"/>
+              </a:ext>
+            </a:extLst>
+          </a:blip>
+          <a:srcRect t="8566" r="51578"/>
+          <a:stretch/>
+        </p:blipFill>
+        <p:spPr bwMode="auto">
+          <a:xfrm>
+            <a:off x="101191" y="1192068"/>
+            <a:ext cx="6087574" cy="7963572"/>
+          </a:xfrm>
+          <a:prstGeom prst="rect">
+            <a:avLst/>
+          </a:prstGeom>
+          <a:noFill/>
+          <a:extLst>
+            <a:ext uri="{909E8E84-426E-40DD-AFC4-6F175D3DCCD1}">
+              <a14:hiddenFill xmlns:a14="http://schemas.microsoft.com/office/drawing/2010/main">
+                <a:solidFill>
+                  <a:srgbClr val="FFFFFF"/>
+                </a:solidFill>
+              </a14:hiddenFill>
+            </a:ext>
+          </a:extLst>
+        </p:spPr>
+      </p:pic>
+      <p:sp>
+        <p:nvSpPr>
+          <p:cNvPr id="2" name="標題 1"/>
+          <p:cNvSpPr>
+            <a:spLocks noGrp="1"/>
+          </p:cNvSpPr>
+          <p:nvPr>
+            <p:ph type="title"/>
+          </p:nvPr>
+        </p:nvSpPr>
+        <p:spPr>
+          <a:xfrm>
+            <a:off x="894080" y="72000"/>
+            <a:ext cx="11216640" cy="1531514"/>
+          </a:xfrm>
+        </p:spPr>
+        <p:txBody>
+          <a:bodyPr/>
+          <a:lstStyle/>
+          <a:p>
+            <a:r>
+              <a:rPr lang="zh-TW" altLang="en-US" dirty="0" smtClean="0"/>
+              <a:t>順序功能流程圖範例</a:t>
+            </a:r>
+            <a:endParaRPr lang="zh-TW" altLang="en-US" dirty="0"/>
+          </a:p>
+        </p:txBody>
+      </p:sp>
+      <p:sp>
+        <p:nvSpPr>
+          <p:cNvPr id="4" name="投影片編號版面配置區 3"/>
+          <p:cNvSpPr>
+            <a:spLocks noGrp="1"/>
+          </p:cNvSpPr>
+          <p:nvPr>
+            <p:ph type="sldNum" sz="quarter" idx="10"/>
+          </p:nvPr>
+        </p:nvSpPr>
+        <p:spPr/>
+        <p:txBody>
+          <a:bodyPr/>
+          <a:lstStyle/>
+          <a:p>
+            <a:fld id="{3DC8462A-F212-4BF9-A318-B4511B1F5B2F}" type="slidenum">
+              <a:rPr lang="zh-TW" altLang="en-US" smtClean="0"/>
+              <a:pPr/>
+              <a:t>23</a:t>
+            </a:fld>
+            <a:endParaRPr lang="zh-TW" altLang="en-US" dirty="0"/>
+          </a:p>
+        </p:txBody>
+      </p:sp>
+      <p:sp>
+        <p:nvSpPr>
+          <p:cNvPr id="6" name="矩形 5">
+            <a:extLst>
+              <a:ext uri="{FF2B5EF4-FFF2-40B4-BE49-F238E27FC236}">
+                <a16:creationId xmlns:a16="http://schemas.microsoft.com/office/drawing/2014/main" id="{2AF12853-97CE-7544-8A50-7E51CA6DF225}"/>
+              </a:ext>
+            </a:extLst>
+          </p:cNvPr>
+          <p:cNvSpPr/>
+          <p:nvPr/>
+        </p:nvSpPr>
+        <p:spPr>
+          <a:xfrm>
+            <a:off x="3962400" y="8461847"/>
+            <a:ext cx="8529600" cy="830997"/>
+          </a:xfrm>
+          <a:prstGeom prst="rect">
+            <a:avLst/>
+          </a:prstGeom>
+        </p:spPr>
+        <p:txBody>
+          <a:bodyPr wrap="square">
+            <a:spAutoFit/>
+          </a:bodyPr>
+          <a:lstStyle/>
+          <a:p>
+            <a:pPr marL="0" lvl="1"/>
+            <a:r>
+              <a:rPr lang="en-US" altLang="zh-TW" sz="1600" dirty="0" smtClean="0"/>
+              <a:t>Reference:</a:t>
+            </a:r>
+            <a:r>
+              <a:rPr lang="zh-TW" altLang="en-US" sz="1600" dirty="0" smtClean="0"/>
+              <a:t> </a:t>
+            </a:r>
+            <a:r>
+              <a:rPr lang="zh-TW" altLang="en-US" sz="1600" dirty="0">
+                <a:hlinkClick r:id="rId3"/>
+              </a:rPr>
+              <a:t>https://image.slidesharecdn.com/introductiontosequentialfunctionchartv1-160229175158/95/introduction-to-sequential-function-chart-v10-4-638.jpg?cb=</a:t>
+            </a:r>
+            <a:r>
+              <a:rPr lang="zh-TW" altLang="en-US" sz="1600" dirty="0" smtClean="0">
+                <a:hlinkClick r:id="rId3"/>
+              </a:rPr>
+              <a:t>1480307701</a:t>
+            </a:r>
+            <a:r>
+              <a:rPr lang="en-US" altLang="zh-TW" sz="1600" dirty="0" smtClean="0"/>
+              <a:t>, </a:t>
+            </a:r>
+            <a:r>
+              <a:rPr lang="en-US" altLang="zh-TW" sz="1600" dirty="0"/>
+              <a:t>access </a:t>
+            </a:r>
+            <a:r>
+              <a:rPr lang="en-US" altLang="zh-TW" sz="1600" dirty="0" smtClean="0"/>
+              <a:t>01-23-2019.</a:t>
+            </a:r>
+            <a:endParaRPr lang="zh-TW" altLang="en-US" sz="1600" dirty="0"/>
+          </a:p>
+        </p:txBody>
+      </p:sp>
+      <p:pic>
+        <p:nvPicPr>
+          <p:cNvPr id="1028" name="Picture 4" descr="ãSequential function chartãçåçæå°çµæ"/>
+          <p:cNvPicPr>
+            <a:picLocks noChangeAspect="1" noChangeArrowheads="1"/>
+          </p:cNvPicPr>
+          <p:nvPr/>
+        </p:nvPicPr>
+        <p:blipFill rotWithShape="1">
+          <a:blip r:embed="rId2">
+            <a:extLst>
+              <a:ext uri="{28A0092B-C50C-407E-A947-70E740481C1C}">
+                <a14:useLocalDpi xmlns:a14="http://schemas.microsoft.com/office/drawing/2010/main" val="0"/>
+              </a:ext>
+            </a:extLst>
+          </a:blip>
+          <a:srcRect l="56719" t="26285" r="7735" b="20203"/>
+          <a:stretch/>
+        </p:blipFill>
+        <p:spPr bwMode="auto">
+          <a:xfrm>
+            <a:off x="6332139" y="1820485"/>
+            <a:ext cx="6159861" cy="6424391"/>
+          </a:xfrm>
+          <a:prstGeom prst="rect">
+            <a:avLst/>
+          </a:prstGeom>
+          <a:noFill/>
+          <a:extLst>
+            <a:ext uri="{909E8E84-426E-40DD-AFC4-6F175D3DCCD1}">
+              <a14:hiddenFill xmlns:a14="http://schemas.microsoft.com/office/drawing/2010/main">
+                <a:solidFill>
+                  <a:srgbClr val="FFFFFF"/>
+                </a:solidFill>
+              </a14:hiddenFill>
+            </a:ext>
+          </a:extLst>
+        </p:spPr>
+      </p:pic>
+    </p:spTree>
+    <p:extLst>
+      <p:ext uri="{BB962C8B-B14F-4D97-AF65-F5344CB8AC3E}">
+        <p14:creationId xmlns:p14="http://schemas.microsoft.com/office/powerpoint/2010/main" val="85686312"/>
+      </p:ext>
+    </p:extLst>
+  </p:cSld>
+  <p:clrMapOvr>
+    <a:masterClrMapping/>
+  </p:clrMapOvr>
+</p:sld>
+</file>
+
+<file path=ppt/slides/slide24.xml><?xml version="1.0" encoding="utf-8"?>
+<p:sld xmlns:a="http://schemas.openxmlformats.org/drawingml/2006/main" xmlns:r="http://schemas.openxmlformats.org/officeDocument/2006/relationships" xmlns:p="http://schemas.openxmlformats.org/presentationml/2006/main">
+  <p:cSld>
+    <p:spTree>
+      <p:nvGrpSpPr>
+        <p:cNvPr id="1" name=""/>
+        <p:cNvGrpSpPr/>
+        <p:nvPr/>
+      </p:nvGrpSpPr>
+      <p:grpSpPr>
+        <a:xfrm>
+          <a:off x="0" y="0"/>
+          <a:ext cx="0" cy="0"/>
+          <a:chOff x="0" y="0"/>
+          <a:chExt cx="0" cy="0"/>
+        </a:xfrm>
+      </p:grpSpPr>
       <p:sp>
         <p:nvSpPr>
           <p:cNvPr id="2" name="標題 1"/>
@@ -7545,13 +7772,14 @@
           <a:lstStyle/>
           <a:p>
             <a:r>
-              <a:rPr lang="en-US" altLang="zh-TW" dirty="0"/>
+              <a:rPr lang="en-US" altLang="zh-TW" dirty="0" smtClean="0"/>
               <a:t>Arduino</a:t>
             </a:r>
             <a:r>
-              <a:rPr lang="zh-TW" altLang="en-US" dirty="0"/>
-              <a:t>執行流程圖</a:t>
-            </a:r>
+              <a:rPr lang="zh-TW" altLang="en-US" dirty="0" smtClean="0"/>
+              <a:t>順序功能流程圖</a:t>
+            </a:r>
+            <a:endParaRPr lang="zh-TW" altLang="en-US" dirty="0"/>
           </a:p>
         </p:txBody>
       </p:sp>
@@ -7573,7 +7801,7 @@
             <a:fld id="{3DC8462A-F212-4BF9-A318-B4511B1F5B2F}" type="slidenum">
               <a:rPr lang="zh-TW" altLang="en-US" smtClean="0"/>
               <a:pPr/>
-              <a:t>23</a:t>
+              <a:t>24</a:t>
             </a:fld>
             <a:endParaRPr lang="zh-TW" altLang="en-US" dirty="0"/>
           </a:p>
@@ -7593,8 +7821,8 @@
         </p:nvSpPr>
         <p:spPr>
           <a:xfrm>
-            <a:off x="5796506" y="3080225"/>
-            <a:ext cx="6335494" cy="3416320"/>
+            <a:off x="5796506" y="2974207"/>
+            <a:ext cx="6335494" cy="4524315"/>
           </a:xfrm>
           <a:prstGeom prst="rect">
             <a:avLst/>
@@ -7636,13 +7864,40 @@
           <a:p>
             <a:pPr algn="ctr"/>
             <a:r>
+              <a:rPr kumimoji="1" lang="zh-TW" altLang="en-US" sz="7200" b="1" dirty="0" smtClean="0">
+                <a:solidFill>
+                  <a:srgbClr val="FF0000"/>
+                </a:solidFill>
+                <a:latin typeface="+mn-ea"/>
+              </a:rPr>
+              <a:t>什麼條件下？</a:t>
+            </a:r>
+            <a:endParaRPr kumimoji="1" lang="en-US" altLang="zh-TW" sz="7200" b="1" dirty="0" smtClean="0">
+              <a:solidFill>
+                <a:srgbClr val="FF0000"/>
+              </a:solidFill>
+              <a:latin typeface="+mn-ea"/>
+            </a:endParaRPr>
+          </a:p>
+          <a:p>
+            <a:pPr algn="ctr"/>
+            <a:r>
+              <a:rPr kumimoji="1" lang="zh-TW" altLang="en-US" sz="7200" b="1" dirty="0" smtClean="0">
+                <a:solidFill>
+                  <a:srgbClr val="FF0000"/>
+                </a:solidFill>
+                <a:latin typeface="+mn-ea"/>
+              </a:rPr>
+              <a:t>要</a:t>
+            </a:r>
+            <a:r>
               <a:rPr kumimoji="1" lang="zh-TW" altLang="en-US" sz="7200" b="1" dirty="0">
                 <a:solidFill>
                   <a:srgbClr val="FF0000"/>
                 </a:solidFill>
                 <a:latin typeface="+mn-ea"/>
               </a:rPr>
-              <a:t>要做什麼？</a:t>
+              <a:t>做什麼？</a:t>
             </a:r>
             <a:endParaRPr kumimoji="1" lang="en-US" altLang="zh-TW" sz="7200" b="1" dirty="0">
               <a:solidFill>
@@ -7654,13 +7909,22 @@
           <a:p>
             <a:pPr algn="ctr"/>
             <a:r>
+              <a:rPr kumimoji="1" lang="zh-TW" altLang="en-US" sz="7200" b="1" dirty="0" smtClean="0">
+                <a:solidFill>
+                  <a:srgbClr val="FF0000"/>
+                </a:solidFill>
+                <a:latin typeface="+mn-ea"/>
+              </a:rPr>
+              <a:t>順序</a:t>
+            </a:r>
+            <a:r>
               <a:rPr kumimoji="1" lang="zh-TW" altLang="en-US" sz="7200" b="1" dirty="0">
                 <a:solidFill>
                   <a:srgbClr val="FF0000"/>
                 </a:solidFill>
                 <a:latin typeface="+mn-ea"/>
               </a:rPr>
-              <a:t>做的順序？</a:t>
+              <a:t>？</a:t>
             </a:r>
           </a:p>
         </p:txBody>
@@ -7714,7 +7978,7 @@
 </p:sld>
 </file>
 
-<file path=ppt/slides/slide24.xml><?xml version="1.0" encoding="utf-8"?>
+<file path=ppt/slides/slide25.xml><?xml version="1.0" encoding="utf-8"?>
 <p:sld xmlns:a="http://schemas.openxmlformats.org/drawingml/2006/main" xmlns:r="http://schemas.openxmlformats.org/officeDocument/2006/relationships" xmlns:p="http://schemas.openxmlformats.org/presentationml/2006/main">
   <p:cSld>
     <p:spTree>
@@ -7747,13 +8011,14 @@
           <a:lstStyle/>
           <a:p>
             <a:r>
-              <a:rPr lang="en-US" altLang="zh-TW" dirty="0"/>
+              <a:rPr lang="en-US" altLang="zh-TW" dirty="0" smtClean="0"/>
               <a:t>Python</a:t>
             </a:r>
             <a:r>
-              <a:rPr lang="zh-TW" altLang="en-US" dirty="0"/>
-              <a:t>執行流程圖</a:t>
-            </a:r>
+              <a:rPr lang="zh-TW" altLang="en-US" dirty="0" smtClean="0"/>
+              <a:t>順序功能流程圖</a:t>
+            </a:r>
+            <a:endParaRPr lang="zh-TW" altLang="en-US" dirty="0"/>
           </a:p>
         </p:txBody>
       </p:sp>
@@ -7775,95 +8040,9 @@
             <a:fld id="{3DC8462A-F212-4BF9-A318-B4511B1F5B2F}" type="slidenum">
               <a:rPr lang="zh-TW" altLang="en-US" smtClean="0"/>
               <a:pPr/>
-              <a:t>24</a:t>
+              <a:t>25</a:t>
             </a:fld>
             <a:endParaRPr lang="zh-TW" altLang="en-US" dirty="0"/>
-          </a:p>
-        </p:txBody>
-      </p:sp>
-      <p:sp>
-        <p:nvSpPr>
-          <p:cNvPr id="5" name="文字方塊 4">
-            <a:extLst>
-              <a:ext uri="{FF2B5EF4-FFF2-40B4-BE49-F238E27FC236}">
-                <a16:creationId xmlns:a16="http://schemas.microsoft.com/office/drawing/2014/main" id="{89725949-B435-614A-A69B-37194FBDCE8B}"/>
-              </a:ext>
-            </a:extLst>
-          </p:cNvPr>
-          <p:cNvSpPr txBox="1"/>
-          <p:nvPr/>
-        </p:nvSpPr>
-        <p:spPr>
-          <a:xfrm>
-            <a:off x="5796506" y="3080225"/>
-            <a:ext cx="6335494" cy="3416320"/>
-          </a:xfrm>
-          <a:prstGeom prst="rect">
-            <a:avLst/>
-          </a:prstGeom>
-          <a:noFill/>
-        </p:spPr>
-        <p:txBody>
-          <a:bodyPr wrap="square" rtlCol="0">
-            <a:spAutoFit/>
-          </a:bodyPr>
-          <a:lstStyle/>
-          <a:p>
-            <a:pPr algn="ctr"/>
-            <a:r>
-              <a:rPr kumimoji="1" lang="en-US" altLang="zh-TW" sz="7200" b="1" dirty="0">
-                <a:solidFill>
-                  <a:srgbClr val="FF0000"/>
-                </a:solidFill>
-                <a:latin typeface="+mn-ea"/>
-              </a:rPr>
-              <a:t>Python</a:t>
-            </a:r>
-            <a:r>
-              <a:rPr kumimoji="1" lang="zh-TW" altLang="en-US" sz="7200" b="1" dirty="0">
-                <a:solidFill>
-                  <a:srgbClr val="FF0000"/>
-                </a:solidFill>
-                <a:latin typeface="+mn-ea"/>
-              </a:rPr>
-              <a:t>：</a:t>
-            </a:r>
-            <a:endParaRPr kumimoji="1" lang="en-US" altLang="zh-TW" sz="7200" b="1" dirty="0">
-              <a:solidFill>
-                <a:srgbClr val="FF0000"/>
-              </a:solidFill>
-              <a:latin typeface="+mn-ea"/>
-            </a:endParaRPr>
-          </a:p>
-          <a:p>
-            <a:pPr algn="ctr"/>
-            <a:r>
-              <a:rPr kumimoji="1" lang="zh-TW" altLang="en-US" sz="7200" b="1" dirty="0">
-                <a:solidFill>
-                  <a:srgbClr val="FF0000"/>
-                </a:solidFill>
-                <a:latin typeface="+mn-ea"/>
-              </a:rPr>
-              <a:t>要做什麼？</a:t>
-            </a:r>
-            <a:endParaRPr kumimoji="1" lang="en-US" altLang="zh-TW" sz="7200" b="1" dirty="0">
-              <a:solidFill>
-                <a:srgbClr val="FF0000"/>
-              </a:solidFill>
-              <a:latin typeface="+mn-ea"/>
-            </a:endParaRPr>
-          </a:p>
-          <a:p>
-            <a:pPr algn="ctr"/>
-            <a:r>
-              <a:rPr kumimoji="1" lang="zh-TW" altLang="en-US" sz="7200" b="1" dirty="0">
-                <a:solidFill>
-                  <a:srgbClr val="FF0000"/>
-                </a:solidFill>
-                <a:latin typeface="+mn-ea"/>
-              </a:rPr>
-              <a:t>做的順序？</a:t>
-            </a:r>
           </a:p>
         </p:txBody>
       </p:sp>
@@ -7903,6 +8082,128 @@
           </a:prstGeom>
         </p:spPr>
       </p:pic>
+      <p:sp>
+        <p:nvSpPr>
+          <p:cNvPr id="9" name="文字方塊 8">
+            <a:extLst>
+              <a:ext uri="{FF2B5EF4-FFF2-40B4-BE49-F238E27FC236}">
+                <a16:creationId xmlns:a16="http://schemas.microsoft.com/office/drawing/2014/main" id="{89725949-B435-614A-A69B-37194FBDCE8B}"/>
+              </a:ext>
+            </a:extLst>
+          </p:cNvPr>
+          <p:cNvSpPr txBox="1"/>
+          <p:nvPr/>
+        </p:nvSpPr>
+        <p:spPr>
+          <a:xfrm>
+            <a:off x="5796506" y="2974207"/>
+            <a:ext cx="6335494" cy="4524315"/>
+          </a:xfrm>
+          <a:prstGeom prst="rect">
+            <a:avLst/>
+          </a:prstGeom>
+          <a:noFill/>
+        </p:spPr>
+        <p:txBody>
+          <a:bodyPr wrap="square" rtlCol="0">
+            <a:spAutoFit/>
+          </a:bodyPr>
+          <a:lstStyle/>
+          <a:p>
+            <a:pPr algn="ctr"/>
+            <a:r>
+              <a:rPr kumimoji="1" lang="en-US" altLang="zh-TW" sz="7200" b="1" dirty="0" smtClean="0">
+                <a:solidFill>
+                  <a:srgbClr val="FF0000"/>
+                </a:solidFill>
+                <a:latin typeface="+mn-ea"/>
+              </a:rPr>
+              <a:t>Python</a:t>
+            </a:r>
+            <a:r>
+              <a:rPr kumimoji="1" lang="zh-TW" altLang="en-US" sz="7200" b="1" dirty="0" smtClean="0">
+                <a:solidFill>
+                  <a:srgbClr val="FF0000"/>
+                </a:solidFill>
+                <a:latin typeface="+mn-ea"/>
+              </a:rPr>
+              <a:t>：</a:t>
+            </a:r>
+            <a:endParaRPr kumimoji="1" lang="en-US" altLang="zh-TW" sz="7200" b="1" dirty="0">
+              <a:solidFill>
+                <a:srgbClr val="FF0000"/>
+              </a:solidFill>
+              <a:latin typeface="+mn-ea"/>
+            </a:endParaRPr>
+          </a:p>
+          <a:p>
+            <a:pPr algn="ctr"/>
+            <a:r>
+              <a:rPr kumimoji="1" lang="zh-TW" altLang="en-US" sz="7200" b="1" dirty="0" smtClean="0">
+                <a:solidFill>
+                  <a:srgbClr val="FF0000"/>
+                </a:solidFill>
+                <a:latin typeface="+mn-ea"/>
+              </a:rPr>
+              <a:t>什麼條件下？</a:t>
+            </a:r>
+            <a:endParaRPr kumimoji="1" lang="en-US" altLang="zh-TW" sz="7200" b="1" dirty="0" smtClean="0">
+              <a:solidFill>
+                <a:srgbClr val="FF0000"/>
+              </a:solidFill>
+              <a:latin typeface="+mn-ea"/>
+            </a:endParaRPr>
+          </a:p>
+          <a:p>
+            <a:pPr algn="ctr"/>
+            <a:r>
+              <a:rPr kumimoji="1" lang="zh-TW" altLang="en-US" sz="7200" b="1" dirty="0" smtClean="0">
+                <a:solidFill>
+                  <a:srgbClr val="FF0000"/>
+                </a:solidFill>
+                <a:latin typeface="+mn-ea"/>
+              </a:rPr>
+              <a:t>要</a:t>
+            </a:r>
+            <a:r>
+              <a:rPr kumimoji="1" lang="zh-TW" altLang="en-US" sz="7200" b="1" dirty="0">
+                <a:solidFill>
+                  <a:srgbClr val="FF0000"/>
+                </a:solidFill>
+                <a:latin typeface="+mn-ea"/>
+              </a:rPr>
+              <a:t>做什麼？</a:t>
+            </a:r>
+            <a:endParaRPr kumimoji="1" lang="en-US" altLang="zh-TW" sz="7200" b="1" dirty="0">
+              <a:solidFill>
+                <a:srgbClr val="FF0000"/>
+              </a:solidFill>
+              <a:latin typeface="+mn-ea"/>
+            </a:endParaRPr>
+          </a:p>
+          <a:p>
+            <a:pPr algn="ctr"/>
+            <a:r>
+              <a:rPr kumimoji="1" lang="zh-TW" altLang="en-US" sz="7200" b="1" dirty="0" smtClean="0">
+                <a:solidFill>
+                  <a:srgbClr val="FF0000"/>
+                </a:solidFill>
+                <a:latin typeface="+mn-ea"/>
+              </a:rPr>
+              <a:t>順序</a:t>
+            </a:r>
+            <a:r>
+              <a:rPr kumimoji="1" lang="zh-TW" altLang="en-US" sz="7200" b="1" dirty="0">
+                <a:solidFill>
+                  <a:srgbClr val="FF0000"/>
+                </a:solidFill>
+                <a:latin typeface="+mn-ea"/>
+              </a:rPr>
+              <a:t>？</a:t>
+            </a:r>
+          </a:p>
+        </p:txBody>
+      </p:sp>
     </p:spTree>
     <p:extLst>
       <p:ext uri="{BB962C8B-B14F-4D97-AF65-F5344CB8AC3E}">
@@ -7916,7 +8217,7 @@
 </p:sld>
 </file>
 
-<file path=ppt/slides/slide25.xml><?xml version="1.0" encoding="utf-8"?>
+<file path=ppt/slides/slide26.xml><?xml version="1.0" encoding="utf-8"?>
 <p:sld xmlns:a="http://schemas.openxmlformats.org/drawingml/2006/main" xmlns:r="http://schemas.openxmlformats.org/officeDocument/2006/relationships" xmlns:p="http://schemas.openxmlformats.org/presentationml/2006/main">
   <p:cSld>
     <p:spTree>
@@ -8005,8 +8306,8 @@
         </p:nvSpPr>
         <p:spPr>
           <a:xfrm>
-            <a:off x="8899644" y="6285032"/>
-            <a:ext cx="3900620" cy="1015663"/>
+            <a:off x="8841299" y="5741692"/>
+            <a:ext cx="3489484" cy="2092881"/>
           </a:xfrm>
           <a:prstGeom prst="rect">
             <a:avLst/>
@@ -8014,24 +8315,67 @@
           <a:noFill/>
         </p:spPr>
         <p:txBody>
-          <a:bodyPr wrap="none" rtlCol="0">
+          <a:bodyPr wrap="square" rtlCol="0">
             <a:spAutoFit/>
           </a:bodyPr>
           <a:lstStyle/>
           <a:p>
             <a:r>
-              <a:rPr kumimoji="1" lang="zh-TW" altLang="en-US" sz="3000" dirty="0">
+              <a:rPr kumimoji="1" lang="zh-TW" altLang="en-US" sz="4000" b="1" dirty="0" smtClean="0">
+                <a:solidFill>
+                  <a:srgbClr val="C9702A"/>
+                </a:solidFill>
+                <a:latin typeface="+mn-ea"/>
+              </a:rPr>
+              <a:t>目的</a:t>
+            </a:r>
+            <a:r>
+              <a:rPr kumimoji="1" lang="zh-TW" altLang="en-US" sz="4000" b="1" dirty="0">
+                <a:solidFill>
+                  <a:srgbClr val="C9702A"/>
+                </a:solidFill>
+                <a:latin typeface="+mn-ea"/>
+              </a:rPr>
+              <a:t>：</a:t>
+            </a:r>
+            <a:endParaRPr kumimoji="1" lang="en-US" altLang="zh-TW" sz="4000" b="1" dirty="0" smtClean="0">
+              <a:solidFill>
+                <a:srgbClr val="C9702A"/>
+              </a:solidFill>
+              <a:latin typeface="+mn-ea"/>
+            </a:endParaRPr>
+          </a:p>
+          <a:p>
+            <a:pPr marL="457200" indent="-457200">
+              <a:buFont typeface="Arial" panose="020B0604020202020204" pitchFamily="34" charset="0"/>
+              <a:buChar char="•"/>
+            </a:pPr>
+            <a:r>
+              <a:rPr kumimoji="1" lang="zh-TW" altLang="en-US" sz="3000" dirty="0" smtClean="0">
+                <a:solidFill>
+                  <a:srgbClr val="406387"/>
+                </a:solidFill>
                 <a:latin typeface="+mn-ea"/>
               </a:rPr>
               <a:t>分工</a:t>
             </a:r>
             <a:endParaRPr kumimoji="1" lang="en-US" altLang="zh-TW" sz="3000" dirty="0">
+              <a:solidFill>
+                <a:srgbClr val="406387"/>
+              </a:solidFill>
               <a:latin typeface="+mn-ea"/>
             </a:endParaRPr>
           </a:p>
           <a:p>
+            <a:pPr marL="457200" indent="-457200">
+              <a:buFont typeface="Arial" panose="020B0604020202020204" pitchFamily="34" charset="0"/>
+              <a:buChar char="•"/>
+            </a:pPr>
             <a:r>
               <a:rPr kumimoji="1" lang="en-US" altLang="zh-TW" sz="3000" dirty="0">
+                <a:solidFill>
+                  <a:srgbClr val="406387"/>
+                </a:solidFill>
                 <a:latin typeface="+mn-ea"/>
               </a:rPr>
               <a:t>Project Management</a:t>
@@ -8057,7 +8401,7 @@
             <a:fld id="{3DC8462A-F212-4BF9-A318-B4511B1F5B2F}" type="slidenum">
               <a:rPr lang="zh-TW" altLang="en-US" smtClean="0"/>
               <a:pPr/>
-              <a:t>25</a:t>
+              <a:t>26</a:t>
             </a:fld>
             <a:endParaRPr lang="zh-TW" altLang="en-US" dirty="0"/>
           </a:p>
@@ -8076,7 +8420,7 @@
 </p:sld>
 </file>
 
-<file path=ppt/slides/slide26.xml><?xml version="1.0" encoding="utf-8"?>
+<file path=ppt/slides/slide27.xml><?xml version="1.0" encoding="utf-8"?>
 <p:sld xmlns:a="http://schemas.openxmlformats.org/drawingml/2006/main" xmlns:r="http://schemas.openxmlformats.org/officeDocument/2006/relationships" xmlns:p="http://schemas.openxmlformats.org/presentationml/2006/main">
   <p:cSld>
     <p:spTree>
@@ -8138,7 +8482,7 @@
             <a:fld id="{3DC8462A-F212-4BF9-A318-B4511B1F5B2F}" type="slidenum">
               <a:rPr lang="zh-TW" altLang="en-US" smtClean="0"/>
               <a:pPr/>
-              <a:t>26</a:t>
+              <a:t>27</a:t>
             </a:fld>
             <a:endParaRPr lang="zh-TW" altLang="en-US" dirty="0"/>
           </a:p>
@@ -9233,7 +9577,7 @@
 </p:sld>
 </file>
 
-<file path=ppt/slides/slide27.xml><?xml version="1.0" encoding="utf-8"?>
+<file path=ppt/slides/slide28.xml><?xml version="1.0" encoding="utf-8"?>
 <p:sld xmlns:a="http://schemas.openxmlformats.org/drawingml/2006/main" xmlns:r="http://schemas.openxmlformats.org/officeDocument/2006/relationships" xmlns:p="http://schemas.openxmlformats.org/presentationml/2006/main">
   <p:cSld>
     <p:spTree>
@@ -9443,7 +9787,7 @@
             <a:fld id="{3DC8462A-F212-4BF9-A318-B4511B1F5B2F}" type="slidenum">
               <a:rPr lang="zh-TW" altLang="en-US" smtClean="0"/>
               <a:pPr/>
-              <a:t>27</a:t>
+              <a:t>28</a:t>
             </a:fld>
             <a:endParaRPr lang="zh-TW" altLang="en-US" dirty="0"/>
           </a:p>
@@ -9462,7 +9806,7 @@
 </p:sld>
 </file>
 
-<file path=ppt/slides/slide28.xml><?xml version="1.0" encoding="utf-8"?>
+<file path=ppt/slides/slide29.xml><?xml version="1.0" encoding="utf-8"?>
 <p:sld xmlns:a="http://schemas.openxmlformats.org/drawingml/2006/main" xmlns:r="http://schemas.openxmlformats.org/officeDocument/2006/relationships" xmlns:p="http://schemas.openxmlformats.org/presentationml/2006/main">
   <p:cSld>
     <p:spTree>
@@ -9497,7 +9841,7 @@
             <a:fld id="{3DC8462A-F212-4BF9-A318-B4511B1F5B2F}" type="slidenum">
               <a:rPr lang="zh-TW" altLang="en-US" smtClean="0"/>
               <a:pPr/>
-              <a:t>28</a:t>
+              <a:t>29</a:t>
             </a:fld>
             <a:endParaRPr lang="zh-TW" altLang="en-US" dirty="0"/>
           </a:p>
@@ -9584,160 +9928,6 @@
     <p:extLst>
       <p:ext uri="{BB962C8B-B14F-4D97-AF65-F5344CB8AC3E}">
         <p14:creationId xmlns:p14="http://schemas.microsoft.com/office/powerpoint/2010/main" val="2932777720"/>
-      </p:ext>
-    </p:extLst>
-  </p:cSld>
-  <p:clrMapOvr>
-    <a:masterClrMapping/>
-  </p:clrMapOvr>
-</p:sld>
-</file>
-
-<file path=ppt/slides/slide29.xml><?xml version="1.0" encoding="utf-8"?>
-<p:sld xmlns:a="http://schemas.openxmlformats.org/drawingml/2006/main" xmlns:r="http://schemas.openxmlformats.org/officeDocument/2006/relationships" xmlns:p="http://schemas.openxmlformats.org/presentationml/2006/main">
-  <p:cSld>
-    <p:spTree>
-      <p:nvGrpSpPr>
-        <p:cNvPr id="1" name=""/>
-        <p:cNvGrpSpPr/>
-        <p:nvPr/>
-      </p:nvGrpSpPr>
-      <p:grpSpPr>
-        <a:xfrm>
-          <a:off x="0" y="0"/>
-          <a:ext cx="0" cy="0"/>
-          <a:chOff x="0" y="0"/>
-          <a:chExt cx="0" cy="0"/>
-        </a:xfrm>
-      </p:grpSpPr>
-      <p:sp>
-        <p:nvSpPr>
-          <p:cNvPr id="2" name="標題 1"/>
-          <p:cNvSpPr>
-            <a:spLocks noGrp="1"/>
-          </p:cNvSpPr>
-          <p:nvPr>
-            <p:ph type="title"/>
-          </p:nvPr>
-        </p:nvSpPr>
-        <p:spPr/>
-        <p:txBody>
-          <a:bodyPr/>
-          <a:lstStyle/>
-          <a:p>
-            <a:r>
-              <a:rPr lang="zh-CN" altLang="en-US" dirty="0"/>
-              <a:t>聯絡資料</a:t>
-            </a:r>
-            <a:endParaRPr lang="zh-TW" altLang="en-US" dirty="0"/>
-          </a:p>
-        </p:txBody>
-      </p:sp>
-      <p:sp>
-        <p:nvSpPr>
-          <p:cNvPr id="3" name="內容版面配置區 2"/>
-          <p:cNvSpPr>
-            <a:spLocks noGrp="1"/>
-          </p:cNvSpPr>
-          <p:nvPr>
-            <p:ph idx="1"/>
-          </p:nvPr>
-        </p:nvSpPr>
-        <p:spPr/>
-        <p:txBody>
-          <a:bodyPr/>
-          <a:lstStyle/>
-          <a:p>
-            <a:r>
-              <a:rPr lang="zh-TW" altLang="en-US" dirty="0"/>
-              <a:t>助教信箱</a:t>
-            </a:r>
-            <a:r>
-              <a:rPr lang="en-US" altLang="zh-TW" dirty="0"/>
-              <a:t>: </a:t>
-            </a:r>
-          </a:p>
-          <a:p>
-            <a:pPr lvl="1"/>
-            <a:r>
-              <a:rPr lang="zh-TW" altLang="en-US" dirty="0"/>
-              <a:t>陳界宇 </a:t>
-            </a:r>
-            <a:r>
-              <a:rPr lang="en-US" altLang="zh-TW" dirty="0">
-                <a:hlinkClick r:id="rId2"/>
-              </a:rPr>
-              <a:t>r07921016@ntu.edu.tw</a:t>
-            </a:r>
-            <a:endParaRPr lang="zh-TW" altLang="en-US" dirty="0"/>
-          </a:p>
-          <a:p>
-            <a:pPr lvl="1"/>
-            <a:r>
-              <a:rPr lang="zh-TW" altLang="en-US" dirty="0"/>
-              <a:t>趙冠豪 </a:t>
-            </a:r>
-            <a:r>
-              <a:rPr lang="en-US" altLang="zh-TW" dirty="0">
-                <a:hlinkClick r:id="rId3"/>
-              </a:rPr>
-              <a:t>b05901180@ntu.edu.tw</a:t>
-            </a:r>
-            <a:endParaRPr lang="zh-TW" altLang="en-US" dirty="0"/>
-          </a:p>
-          <a:p>
-            <a:pPr lvl="1"/>
-            <a:r>
-              <a:rPr lang="zh-TW" altLang="en-US" dirty="0"/>
-              <a:t>周武堂 </a:t>
-            </a:r>
-            <a:r>
-              <a:rPr lang="en-US" altLang="zh-TW" dirty="0">
-                <a:hlinkClick r:id="rId4"/>
-              </a:rPr>
-              <a:t>b05901121@ntu.edu.tw</a:t>
-            </a:r>
-            <a:endParaRPr lang="en-US" altLang="zh-TW" dirty="0"/>
-          </a:p>
-          <a:p>
-            <a:endParaRPr lang="en-US" altLang="zh-TW" dirty="0"/>
-          </a:p>
-          <a:p>
-            <a:r>
-              <a:rPr lang="zh-TW" altLang="en-US" dirty="0"/>
-              <a:t>請不要私訊助教</a:t>
-            </a:r>
-          </a:p>
-        </p:txBody>
-      </p:sp>
-      <p:sp>
-        <p:nvSpPr>
-          <p:cNvPr id="6" name="投影片編號版面配置區 5"/>
-          <p:cNvSpPr>
-            <a:spLocks noGrp="1"/>
-          </p:cNvSpPr>
-          <p:nvPr>
-            <p:ph type="sldNum" sz="quarter" idx="10"/>
-          </p:nvPr>
-        </p:nvSpPr>
-        <p:spPr/>
-        <p:txBody>
-          <a:bodyPr/>
-          <a:lstStyle/>
-          <a:p>
-            <a:fld id="{3DC8462A-F212-4BF9-A318-B4511B1F5B2F}" type="slidenum">
-              <a:rPr lang="zh-TW" altLang="en-US" smtClean="0"/>
-              <a:pPr/>
-              <a:t>29</a:t>
-            </a:fld>
-            <a:endParaRPr lang="zh-TW" altLang="en-US" dirty="0"/>
-          </a:p>
-        </p:txBody>
-      </p:sp>
-    </p:spTree>
-    <p:extLst>
-      <p:ext uri="{BB962C8B-B14F-4D97-AF65-F5344CB8AC3E}">
-        <p14:creationId xmlns:p14="http://schemas.microsoft.com/office/powerpoint/2010/main" val="1531082891"/>
       </p:ext>
     </p:extLst>
   </p:cSld>
@@ -10479,6 +10669,160 @@
     <p:extLst>
       <p:ext uri="{BB962C8B-B14F-4D97-AF65-F5344CB8AC3E}">
         <p14:creationId xmlns:p14="http://schemas.microsoft.com/office/powerpoint/2010/main" val="160394744"/>
+      </p:ext>
+    </p:extLst>
+  </p:cSld>
+  <p:clrMapOvr>
+    <a:masterClrMapping/>
+  </p:clrMapOvr>
+</p:sld>
+</file>
+
+<file path=ppt/slides/slide30.xml><?xml version="1.0" encoding="utf-8"?>
+<p:sld xmlns:a="http://schemas.openxmlformats.org/drawingml/2006/main" xmlns:r="http://schemas.openxmlformats.org/officeDocument/2006/relationships" xmlns:p="http://schemas.openxmlformats.org/presentationml/2006/main">
+  <p:cSld>
+    <p:spTree>
+      <p:nvGrpSpPr>
+        <p:cNvPr id="1" name=""/>
+        <p:cNvGrpSpPr/>
+        <p:nvPr/>
+      </p:nvGrpSpPr>
+      <p:grpSpPr>
+        <a:xfrm>
+          <a:off x="0" y="0"/>
+          <a:ext cx="0" cy="0"/>
+          <a:chOff x="0" y="0"/>
+          <a:chExt cx="0" cy="0"/>
+        </a:xfrm>
+      </p:grpSpPr>
+      <p:sp>
+        <p:nvSpPr>
+          <p:cNvPr id="2" name="標題 1"/>
+          <p:cNvSpPr>
+            <a:spLocks noGrp="1"/>
+          </p:cNvSpPr>
+          <p:nvPr>
+            <p:ph type="title"/>
+          </p:nvPr>
+        </p:nvSpPr>
+        <p:spPr/>
+        <p:txBody>
+          <a:bodyPr/>
+          <a:lstStyle/>
+          <a:p>
+            <a:r>
+              <a:rPr lang="zh-CN" altLang="en-US" dirty="0"/>
+              <a:t>聯絡資料</a:t>
+            </a:r>
+            <a:endParaRPr lang="zh-TW" altLang="en-US" dirty="0"/>
+          </a:p>
+        </p:txBody>
+      </p:sp>
+      <p:sp>
+        <p:nvSpPr>
+          <p:cNvPr id="3" name="內容版面配置區 2"/>
+          <p:cNvSpPr>
+            <a:spLocks noGrp="1"/>
+          </p:cNvSpPr>
+          <p:nvPr>
+            <p:ph idx="1"/>
+          </p:nvPr>
+        </p:nvSpPr>
+        <p:spPr/>
+        <p:txBody>
+          <a:bodyPr/>
+          <a:lstStyle/>
+          <a:p>
+            <a:r>
+              <a:rPr lang="zh-TW" altLang="en-US" dirty="0"/>
+              <a:t>助教信箱</a:t>
+            </a:r>
+            <a:r>
+              <a:rPr lang="en-US" altLang="zh-TW" dirty="0"/>
+              <a:t>: </a:t>
+            </a:r>
+          </a:p>
+          <a:p>
+            <a:pPr lvl="1"/>
+            <a:r>
+              <a:rPr lang="zh-TW" altLang="en-US" dirty="0"/>
+              <a:t>陳界宇 </a:t>
+            </a:r>
+            <a:r>
+              <a:rPr lang="en-US" altLang="zh-TW" dirty="0">
+                <a:hlinkClick r:id="rId2"/>
+              </a:rPr>
+              <a:t>r07921016@ntu.edu.tw</a:t>
+            </a:r>
+            <a:endParaRPr lang="zh-TW" altLang="en-US" dirty="0"/>
+          </a:p>
+          <a:p>
+            <a:pPr lvl="1"/>
+            <a:r>
+              <a:rPr lang="zh-TW" altLang="en-US" dirty="0"/>
+              <a:t>趙冠豪 </a:t>
+            </a:r>
+            <a:r>
+              <a:rPr lang="en-US" altLang="zh-TW" dirty="0">
+                <a:hlinkClick r:id="rId3"/>
+              </a:rPr>
+              <a:t>b05901180@ntu.edu.tw</a:t>
+            </a:r>
+            <a:endParaRPr lang="zh-TW" altLang="en-US" dirty="0"/>
+          </a:p>
+          <a:p>
+            <a:pPr lvl="1"/>
+            <a:r>
+              <a:rPr lang="zh-TW" altLang="en-US" dirty="0"/>
+              <a:t>周武堂 </a:t>
+            </a:r>
+            <a:r>
+              <a:rPr lang="en-US" altLang="zh-TW" dirty="0">
+                <a:hlinkClick r:id="rId4"/>
+              </a:rPr>
+              <a:t>b05901121@ntu.edu.tw</a:t>
+            </a:r>
+            <a:endParaRPr lang="en-US" altLang="zh-TW" dirty="0"/>
+          </a:p>
+          <a:p>
+            <a:endParaRPr lang="en-US" altLang="zh-TW" dirty="0"/>
+          </a:p>
+          <a:p>
+            <a:r>
+              <a:rPr lang="zh-TW" altLang="en-US" dirty="0"/>
+              <a:t>請不要私訊助教</a:t>
+            </a:r>
+          </a:p>
+        </p:txBody>
+      </p:sp>
+      <p:sp>
+        <p:nvSpPr>
+          <p:cNvPr id="6" name="投影片編號版面配置區 5"/>
+          <p:cNvSpPr>
+            <a:spLocks noGrp="1"/>
+          </p:cNvSpPr>
+          <p:nvPr>
+            <p:ph type="sldNum" sz="quarter" idx="10"/>
+          </p:nvPr>
+        </p:nvSpPr>
+        <p:spPr/>
+        <p:txBody>
+          <a:bodyPr/>
+          <a:lstStyle/>
+          <a:p>
+            <a:fld id="{3DC8462A-F212-4BF9-A318-B4511B1F5B2F}" type="slidenum">
+              <a:rPr lang="zh-TW" altLang="en-US" smtClean="0"/>
+              <a:pPr/>
+              <a:t>30</a:t>
+            </a:fld>
+            <a:endParaRPr lang="zh-TW" altLang="en-US" dirty="0"/>
+          </a:p>
+        </p:txBody>
+      </p:sp>
+    </p:spTree>
+    <p:extLst>
+      <p:ext uri="{BB962C8B-B14F-4D97-AF65-F5344CB8AC3E}">
+        <p14:creationId xmlns:p14="http://schemas.microsoft.com/office/powerpoint/2010/main" val="1531082891"/>
       </p:ext>
     </p:extLst>
   </p:cSld>

</xml_diff>